<commit_message>
Tweaks to time presenation
</commit_message>
<xml_diff>
--- a/Project Presentation.pptx
+++ b/Project Presentation.pptx
@@ -242,7 +242,7 @@
           <a:p>
             <a:fld id="{45E2D058-9647-498D-80EE-CE627AFC868E}" type="datetimeFigureOut">
               <a:rPr lang="en-US" smtClean="0"/>
-              <a:t>1/1/22</a:t>
+              <a:t>1/4/22</a:t>
             </a:fld>
             <a:endParaRPr lang="en-US"/>
           </a:p>
@@ -408,7 +408,7 @@
             <a:fld id="{7AB488F7-1FAC-40D2-BB7E-BA3CE28D8950}" type="datetimeFigureOut">
               <a:rPr lang="en-US" smtClean="0"/>
               <a:pPr/>
-              <a:t>1/1/22</a:t>
+              <a:t>1/4/22</a:t>
             </a:fld>
             <a:endParaRPr lang="en-US"/>
           </a:p>
@@ -1746,7 +1746,7 @@
                 </a:solidFill>
               </a:rPr>
               <a:pPr/>
-              <a:t>1/1/22</a:t>
+              <a:t>1/4/22</a:t>
             </a:fld>
             <a:endParaRPr lang="en-US">
               <a:solidFill>
@@ -2053,7 +2053,7 @@
                 </a:solidFill>
               </a:rPr>
               <a:pPr/>
-              <a:t>1/1/22</a:t>
+              <a:t>1/4/22</a:t>
             </a:fld>
             <a:endParaRPr lang="en-US">
               <a:solidFill>
@@ -2337,7 +2337,7 @@
                 </a:solidFill>
               </a:rPr>
               <a:pPr/>
-              <a:t>1/1/22</a:t>
+              <a:t>1/4/22</a:t>
             </a:fld>
             <a:endParaRPr lang="en-US">
               <a:solidFill>
@@ -2537,7 +2537,7 @@
                 </a:solidFill>
               </a:rPr>
               <a:pPr/>
-              <a:t>1/1/22</a:t>
+              <a:t>1/4/22</a:t>
             </a:fld>
             <a:endParaRPr lang="en-US">
               <a:solidFill>
@@ -2747,7 +2747,7 @@
                 </a:solidFill>
               </a:rPr>
               <a:pPr/>
-              <a:t>1/1/22</a:t>
+              <a:t>1/4/22</a:t>
             </a:fld>
             <a:endParaRPr lang="en-US">
               <a:solidFill>
@@ -2874,7 +2874,7 @@
                 </a:solidFill>
               </a:rPr>
               <a:pPr/>
-              <a:t>1/1/22</a:t>
+              <a:t>1/4/22</a:t>
             </a:fld>
             <a:endParaRPr lang="en-US">
               <a:solidFill>
@@ -3133,7 +3133,7 @@
           <a:p>
             <a:fld id="{6204E2B0-FEF2-4C8F-90A4-46C9D72643E3}" type="datetime1">
               <a:rPr lang="en-US" smtClean="0"/>
-              <a:t>1/1/22</a:t>
+              <a:t>1/4/22</a:t>
             </a:fld>
             <a:endParaRPr lang="en-US"/>
           </a:p>
@@ -3477,7 +3477,7 @@
                 </a:solidFill>
               </a:rPr>
               <a:pPr/>
-              <a:t>1/1/22</a:t>
+              <a:t>1/4/22</a:t>
             </a:fld>
             <a:endParaRPr lang="en-US">
               <a:solidFill>
@@ -3677,7 +3677,7 @@
                 </a:solidFill>
               </a:rPr>
               <a:pPr/>
-              <a:t>1/1/22</a:t>
+              <a:t>1/4/22</a:t>
             </a:fld>
             <a:endParaRPr lang="en-US">
               <a:solidFill>
@@ -3954,7 +3954,7 @@
                 </a:solidFill>
               </a:rPr>
               <a:pPr/>
-              <a:t>1/1/22</a:t>
+              <a:t>1/4/22</a:t>
             </a:fld>
             <a:endParaRPr lang="en-US">
               <a:solidFill>
@@ -4271,7 +4271,7 @@
                 </a:solidFill>
               </a:rPr>
               <a:pPr/>
-              <a:t>1/1/22</a:t>
+              <a:t>1/4/22</a:t>
             </a:fld>
             <a:endParaRPr lang="en-US">
               <a:solidFill>
@@ -4722,7 +4722,7 @@
                 </a:solidFill>
               </a:rPr>
               <a:pPr/>
-              <a:t>1/1/22</a:t>
+              <a:t>1/4/22</a:t>
             </a:fld>
             <a:endParaRPr lang="en-US">
               <a:solidFill>
@@ -4849,7 +4849,7 @@
                 </a:solidFill>
               </a:rPr>
               <a:pPr/>
-              <a:t>1/1/22</a:t>
+              <a:t>1/4/22</a:t>
             </a:fld>
             <a:endParaRPr lang="en-US">
               <a:solidFill>
@@ -5016,7 +5016,7 @@
                 </a:solidFill>
               </a:rPr>
               <a:pPr/>
-              <a:t>1/1/22</a:t>
+              <a:t>1/4/22</a:t>
             </a:fld>
             <a:endParaRPr lang="en-US">
               <a:solidFill>
@@ -5223,7 +5223,7 @@
                 </a:solidFill>
               </a:rPr>
               <a:pPr/>
-              <a:t>1/1/22</a:t>
+              <a:t>1/4/22</a:t>
             </a:fld>
             <a:endParaRPr lang="en-US">
               <a:solidFill>
@@ -5481,7 +5481,7 @@
                 </a:solidFill>
               </a:rPr>
               <a:pPr defTabSz="1218895"/>
-              <a:t>1/1/22</a:t>
+              <a:t>1/4/22</a:t>
             </a:fld>
             <a:endParaRPr lang="en-US">
               <a:solidFill>
@@ -9063,7 +9063,7 @@
         <p:spPr>
           <a:xfrm>
             <a:off x="790163" y="6252886"/>
-            <a:ext cx="10186986" cy="830997"/>
+            <a:ext cx="10186986" cy="430887"/>
           </a:xfrm>
           <a:prstGeom prst="rect">
             <a:avLst/>
@@ -9077,7 +9077,7 @@
           <a:lstStyle/>
           <a:p>
             <a:r>
-              <a:rPr lang="en-US" b="1" dirty="0">
+              <a:rPr lang="en-US" sz="2200" b="1" dirty="0">
                 <a:solidFill>
                   <a:schemeClr val="accent6">
                     <a:lumMod val="75000"/>
@@ -9087,7 +9087,7 @@
               <a:t>Conclusion: </a:t>
             </a:r>
             <a:r>
-              <a:rPr lang="en-US" dirty="0">
+              <a:rPr lang="en-US" sz="2200" dirty="0">
                 <a:solidFill>
                   <a:schemeClr val="accent6">
                     <a:lumMod val="75000"/>
@@ -9097,7 +9097,7 @@
               <a:t>Per state</a:t>
             </a:r>
             <a:r>
-              <a:rPr lang="en-US" b="1" dirty="0">
+              <a:rPr lang="en-US" sz="2200" b="1" dirty="0">
                 <a:solidFill>
                   <a:schemeClr val="accent6">
                     <a:lumMod val="75000"/>
@@ -9107,7 +9107,7 @@
               <a:t>, </a:t>
             </a:r>
             <a:r>
-              <a:rPr lang="en-US" dirty="0">
+              <a:rPr lang="en-US" sz="2200" dirty="0">
                 <a:solidFill>
                   <a:schemeClr val="accent6">
                     <a:lumMod val="75000"/>
@@ -12056,7 +12056,23 @@
                   <a:srgbClr val="595D74"/>
                 </a:solidFill>
               </a:rPr>
-              <a:t>Intervention, whether legislation, safety parameters or other measures seem to have significantly impacted the rate of car crash fatalities since 1989.</a:t>
+              <a:t>Intervention, whether legislation, safety parameters or other measures seem to have </a:t>
+            </a:r>
+            <a:r>
+              <a:rPr lang="en-US" sz="1500" b="1" dirty="0">
+                <a:solidFill>
+                  <a:srgbClr val="0071C7"/>
+                </a:solidFill>
+              </a:rPr>
+              <a:t>significantly reduced </a:t>
+            </a:r>
+            <a:r>
+              <a:rPr lang="en-US" sz="1500" dirty="0">
+                <a:solidFill>
+                  <a:srgbClr val="595D74"/>
+                </a:solidFill>
+              </a:rPr>
+              <a:t>the rate of car crash fatalities since 1989.</a:t>
             </a:r>
           </a:p>
         </p:txBody>
@@ -12090,12 +12106,44 @@
           <a:lstStyle/>
           <a:p>
             <a:r>
+              <a:rPr lang="en-US" sz="1500" b="1" dirty="0">
+                <a:solidFill>
+                  <a:srgbClr val="0071C7"/>
+                </a:solidFill>
+              </a:rPr>
+              <a:t>There has not </a:t>
+            </a:r>
+            <a:r>
               <a:rPr lang="en-US" sz="1500" dirty="0">
                 <a:solidFill>
                   <a:srgbClr val="595D74"/>
                 </a:solidFill>
               </a:rPr>
-              <a:t>There has not been a statistically significant increase in fatal crashes around major holidays (Christmas and Easter), or any particular month.</a:t>
+              <a:t>been a statistically significant increase in fatal crashes around major holidays (</a:t>
+            </a:r>
+            <a:r>
+              <a:rPr lang="en-US" sz="1500" b="1" dirty="0">
+                <a:solidFill>
+                  <a:srgbClr val="0071C7"/>
+                </a:solidFill>
+              </a:rPr>
+              <a:t>Christmas and Easter</a:t>
+            </a:r>
+            <a:r>
+              <a:rPr lang="en-US" sz="1500" dirty="0">
+                <a:solidFill>
+                  <a:srgbClr val="595D74"/>
+                </a:solidFill>
+              </a:rPr>
+              <a:t>), or </a:t>
+            </a:r>
+            <a:r>
+              <a:rPr lang="en-US" sz="1500" b="1" dirty="0">
+                <a:solidFill>
+                  <a:srgbClr val="0071C7"/>
+                </a:solidFill>
+              </a:rPr>
+              <a:t>any particular month.</a:t>
             </a:r>
           </a:p>
           <a:p>
@@ -12118,7 +12166,7 @@
         <p:spPr>
           <a:xfrm>
             <a:off x="2125433" y="3790163"/>
-            <a:ext cx="8096512" cy="553998"/>
+            <a:ext cx="8261557" cy="553998"/>
           </a:xfrm>
           <a:prstGeom prst="rect">
             <a:avLst/>
@@ -12137,7 +12185,23 @@
                   <a:srgbClr val="595D74"/>
                 </a:solidFill>
               </a:rPr>
-              <a:t>There is a statistically significant increase in fatal crashes on Saturday, Friday and Sunday, respectively.</a:t>
+              <a:t>There is </a:t>
+            </a:r>
+            <a:r>
+              <a:rPr lang="en-US" sz="1500" b="1" dirty="0">
+                <a:solidFill>
+                  <a:srgbClr val="0071C7"/>
+                </a:solidFill>
+              </a:rPr>
+              <a:t>a statistically significant increase in fatal crashes on Saturday, Friday and Sunday</a:t>
+            </a:r>
+            <a:r>
+              <a:rPr lang="en-US" sz="1500" dirty="0">
+                <a:solidFill>
+                  <a:srgbClr val="595D74"/>
+                </a:solidFill>
+              </a:rPr>
+              <a:t>, respectively.</a:t>
             </a:r>
           </a:p>
           <a:p>
@@ -12179,7 +12243,23 @@
                   <a:srgbClr val="595D74"/>
                 </a:solidFill>
               </a:rPr>
-              <a:t>Time of day matters as well. Overall, evenings have a statistically significant increase in number of fatal crashes. </a:t>
+              <a:t>Time of day matters as well. Overall, </a:t>
+            </a:r>
+            <a:r>
+              <a:rPr lang="en-US" sz="1500" b="1" dirty="0">
+                <a:solidFill>
+                  <a:srgbClr val="0071C7"/>
+                </a:solidFill>
+              </a:rPr>
+              <a:t>evenings have a statistically significant increase </a:t>
+            </a:r>
+            <a:r>
+              <a:rPr lang="en-US" sz="1500" dirty="0">
+                <a:solidFill>
+                  <a:srgbClr val="595D74"/>
+                </a:solidFill>
+              </a:rPr>
+              <a:t>in number of fatal crashes. </a:t>
             </a:r>
           </a:p>
           <a:p>
@@ -12202,7 +12282,7 @@
         <p:spPr>
           <a:xfrm>
             <a:off x="2126301" y="4470588"/>
-            <a:ext cx="6094489" cy="553998"/>
+            <a:ext cx="8298490" cy="553998"/>
           </a:xfrm>
           <a:prstGeom prst="rect">
             <a:avLst/>
@@ -12221,7 +12301,23 @@
                   <a:srgbClr val="595D74"/>
                 </a:solidFill>
               </a:rPr>
-              <a:t>Fatal crashes occurring at night are more common on Saturday and Sunday.</a:t>
+              <a:t>The majority of fatal crashes on </a:t>
+            </a:r>
+            <a:r>
+              <a:rPr lang="en-US" sz="1500" b="1" dirty="0">
+                <a:solidFill>
+                  <a:srgbClr val="0071C7"/>
+                </a:solidFill>
+              </a:rPr>
+              <a:t>Saturday and Sunday happen at night between 12:00 am and 6:00 am</a:t>
+            </a:r>
+            <a:r>
+              <a:rPr lang="en-US" sz="1500" dirty="0">
+                <a:solidFill>
+                  <a:srgbClr val="595D74"/>
+                </a:solidFill>
+              </a:rPr>
+              <a:t>. </a:t>
             </a:r>
           </a:p>
           <a:p>

</xml_diff>